<commit_message>
updated interface and controllers
</commit_message>
<xml_diff>
--- a/EPICDocuments/presentation-projectday.pptx
+++ b/EPICDocuments/presentation-projectday.pptx
@@ -6,6 +6,7 @@
   </p:sldMasterIdLst>
   <p:sldIdLst>
     <p:sldId id="256" r:id="rId2"/>
+    <p:sldId id="257" r:id="rId3"/>
   </p:sldIdLst>
   <p:sldSz cx="12192000" cy="6858000"/>
   <p:notesSz cx="6858000" cy="9144000"/>
@@ -3226,6 +3227,36 @@
 </p:sld>
 </file>
 
+<file path=ppt/slides/slide2.xml><?xml version="1.0" encoding="utf-8"?>
+<p:sld xmlns:a="http://schemas.openxmlformats.org/drawingml/2006/main" xmlns:r="http://schemas.openxmlformats.org/officeDocument/2006/relationships" xmlns:p="http://schemas.openxmlformats.org/presentationml/2006/main">
+  <p:cSld>
+    <p:spTree>
+      <p:nvGrpSpPr>
+        <p:cNvPr id="1" name=""/>
+        <p:cNvGrpSpPr/>
+        <p:nvPr/>
+      </p:nvGrpSpPr>
+      <p:grpSpPr>
+        <a:xfrm>
+          <a:off x="0" y="0"/>
+          <a:ext cx="0" cy="0"/>
+          <a:chOff x="0" y="0"/>
+          <a:chExt cx="0" cy="0"/>
+        </a:xfrm>
+      </p:grpSpPr>
+    </p:spTree>
+    <p:extLst>
+      <p:ext uri="{BB962C8B-B14F-4D97-AF65-F5344CB8AC3E}">
+        <p14:creationId xmlns:p14="http://schemas.microsoft.com/office/powerpoint/2010/main" val="2842630428"/>
+      </p:ext>
+    </p:extLst>
+  </p:cSld>
+  <p:clrMapOvr>
+    <a:masterClrMapping/>
+  </p:clrMapOvr>
+</p:sld>
+</file>
+
 <file path=ppt/theme/theme1.xml><?xml version="1.0" encoding="utf-8"?>
 <a:theme xmlns:a="http://schemas.openxmlformats.org/drawingml/2006/main" name="Office Theme">
   <a:themeElements>

</xml_diff>